<commit_message>
added wirkflow github action
</commit_message>
<xml_diff>
--- a/presentation.pptx
+++ b/presentation.pptx
@@ -4788,6 +4788,83 @@
           </a:prstGeom>
         </p:spPr>
       </p:pic>
+      <p:pic>
+        <p:nvPicPr>
+          <p:cNvPr id="5" name="Рисунок 4">
+            <a:extLst>
+              <a:ext uri="{FF2B5EF4-FFF2-40B4-BE49-F238E27FC236}">
+                <a16:creationId xmlns:a16="http://schemas.microsoft.com/office/drawing/2014/main" id="{765CDF30-6A8F-4A9A-9358-E760F2E9A737}"/>
+              </a:ext>
+            </a:extLst>
+          </p:cNvPr>
+          <p:cNvPicPr>
+            <a:picLocks noChangeAspect="1"/>
+          </p:cNvPicPr>
+          <p:nvPr/>
+        </p:nvPicPr>
+        <p:blipFill>
+          <a:blip r:embed="rId3"/>
+          <a:stretch>
+            <a:fillRect/>
+          </a:stretch>
+        </p:blipFill>
+        <p:spPr>
+          <a:xfrm>
+            <a:off x="2803430" y="1480564"/>
+            <a:ext cx="1125103" cy="522935"/>
+          </a:xfrm>
+          <a:prstGeom prst="rect">
+            <a:avLst/>
+          </a:prstGeom>
+        </p:spPr>
+      </p:pic>
+      <p:sp>
+        <p:nvSpPr>
+          <p:cNvPr id="6" name="Прямоугольник 5">
+            <a:extLst>
+              <a:ext uri="{FF2B5EF4-FFF2-40B4-BE49-F238E27FC236}">
+                <a16:creationId xmlns:a16="http://schemas.microsoft.com/office/drawing/2014/main" id="{0F3CA22A-21DC-43EB-B74D-753B8D34193A}"/>
+              </a:ext>
+            </a:extLst>
+          </p:cNvPr>
+          <p:cNvSpPr/>
+          <p:nvPr/>
+        </p:nvSpPr>
+        <p:spPr>
+          <a:xfrm>
+            <a:off x="1219200" y="1397001"/>
+            <a:ext cx="3776133" cy="2700866"/>
+          </a:xfrm>
+          <a:prstGeom prst="rect">
+            <a:avLst/>
+          </a:prstGeom>
+          <a:noFill/>
+        </p:spPr>
+        <p:style>
+          <a:lnRef idx="2">
+            <a:schemeClr val="accent1">
+              <a:shade val="50000"/>
+            </a:schemeClr>
+          </a:lnRef>
+          <a:fillRef idx="1">
+            <a:schemeClr val="accent1"/>
+          </a:fillRef>
+          <a:effectRef idx="0">
+            <a:schemeClr val="accent1"/>
+          </a:effectRef>
+          <a:fontRef idx="minor">
+            <a:schemeClr val="lt1"/>
+          </a:fontRef>
+        </p:style>
+        <p:txBody>
+          <a:bodyPr rtlCol="0" anchor="ctr"/>
+          <a:lstStyle/>
+          <a:p>
+            <a:pPr algn="ctr"/>
+            <a:endParaRPr lang="ru-RU" dirty="0"/>
+          </a:p>
+        </p:txBody>
+      </p:sp>
     </p:spTree>
     <p:extLst>
       <p:ext uri="{BB962C8B-B14F-4D97-AF65-F5344CB8AC3E}">
@@ -4863,7 +4940,7 @@
         <p:spPr>
           <a:xfrm>
             <a:off x="412044" y="2787779"/>
-            <a:ext cx="11779956" cy="3970318"/>
+            <a:ext cx="11779956" cy="3693319"/>
           </a:xfrm>
           <a:prstGeom prst="rect">
             <a:avLst/>
@@ -4950,6 +5027,20 @@
           <a:p>
             <a:r>
               <a:rPr lang="ru-RU" dirty="0"/>
+              <a:t>Вернул </a:t>
+            </a:r>
+            <a:r>
+              <a:rPr lang="ru-RU" dirty="0" err="1"/>
+              <a:t>автоскейлер</a:t>
+            </a:r>
+            <a:r>
+              <a:rPr lang="ru-RU" dirty="0"/>
+              <a:t>.</a:t>
+            </a:r>
+          </a:p>
+          <a:p>
+            <a:r>
+              <a:rPr lang="ru-RU" dirty="0"/>
               <a:t>Количество </a:t>
             </a:r>
             <a:r>
@@ -4976,15 +5067,6 @@
           <a:p>
             <a:r>
               <a:rPr lang="ru-RU" dirty="0"/>
-              <a:t>Петя поставил по всем параметрам зеленые точки, что приятно.</a:t>
-            </a:r>
-          </a:p>
-          <a:p>
-            <a:endParaRPr lang="en-US" dirty="0"/>
-          </a:p>
-          <a:p>
-            <a:r>
-              <a:rPr lang="ru-RU" dirty="0"/>
               <a:t>В качестве репозитория</a:t>
             </a:r>
             <a:r>
@@ -5058,6 +5140,83 @@
               <a:rPr lang="en-US" dirty="0"/>
               <a:t>self-hosted runners.</a:t>
             </a:r>
+            <a:endParaRPr lang="ru-RU" dirty="0"/>
+          </a:p>
+        </p:txBody>
+      </p:sp>
+      <p:pic>
+        <p:nvPicPr>
+          <p:cNvPr id="4" name="Рисунок 3">
+            <a:extLst>
+              <a:ext uri="{FF2B5EF4-FFF2-40B4-BE49-F238E27FC236}">
+                <a16:creationId xmlns:a16="http://schemas.microsoft.com/office/drawing/2014/main" id="{ACB7D19B-D39A-4294-B234-B0C2E046E9CF}"/>
+              </a:ext>
+            </a:extLst>
+          </p:cNvPr>
+          <p:cNvPicPr>
+            <a:picLocks noChangeAspect="1"/>
+          </p:cNvPicPr>
+          <p:nvPr/>
+        </p:nvPicPr>
+        <p:blipFill>
+          <a:blip r:embed="rId3"/>
+          <a:stretch>
+            <a:fillRect/>
+          </a:stretch>
+        </p:blipFill>
+        <p:spPr>
+          <a:xfrm>
+            <a:off x="4834466" y="706331"/>
+            <a:ext cx="727170" cy="337980"/>
+          </a:xfrm>
+          <a:prstGeom prst="rect">
+            <a:avLst/>
+          </a:prstGeom>
+        </p:spPr>
+      </p:pic>
+      <p:sp>
+        <p:nvSpPr>
+          <p:cNvPr id="5" name="Прямоугольник 4">
+            <a:extLst>
+              <a:ext uri="{FF2B5EF4-FFF2-40B4-BE49-F238E27FC236}">
+                <a16:creationId xmlns:a16="http://schemas.microsoft.com/office/drawing/2014/main" id="{312C9151-2ADE-4060-8FA5-AF514F4431F7}"/>
+              </a:ext>
+            </a:extLst>
+          </p:cNvPr>
+          <p:cNvSpPr/>
+          <p:nvPr/>
+        </p:nvSpPr>
+        <p:spPr>
+          <a:xfrm>
+            <a:off x="3250236" y="622767"/>
+            <a:ext cx="2440568" cy="1536204"/>
+          </a:xfrm>
+          <a:prstGeom prst="rect">
+            <a:avLst/>
+          </a:prstGeom>
+          <a:noFill/>
+        </p:spPr>
+        <p:style>
+          <a:lnRef idx="2">
+            <a:schemeClr val="accent1">
+              <a:shade val="50000"/>
+            </a:schemeClr>
+          </a:lnRef>
+          <a:fillRef idx="1">
+            <a:schemeClr val="accent1"/>
+          </a:fillRef>
+          <a:effectRef idx="0">
+            <a:schemeClr val="accent1"/>
+          </a:effectRef>
+          <a:fontRef idx="minor">
+            <a:schemeClr val="lt1"/>
+          </a:fontRef>
+        </p:style>
+        <p:txBody>
+          <a:bodyPr rtlCol="0" anchor="ctr"/>
+          <a:lstStyle/>
+          <a:p>
+            <a:pPr algn="ctr"/>
             <a:endParaRPr lang="ru-RU" dirty="0"/>
           </a:p>
         </p:txBody>
@@ -5107,14 +5266,14 @@
           <p:nvPr>
             <p:extLst>
               <p:ext uri="{D42A27DB-BD31-4B8C-83A1-F6EECF244321}">
-                <p14:modId xmlns:p14="http://schemas.microsoft.com/office/powerpoint/2010/main" val="4062084582"/>
+                <p14:modId xmlns:p14="http://schemas.microsoft.com/office/powerpoint/2010/main" val="3205468032"/>
               </p:ext>
             </p:extLst>
           </p:nvPr>
         </p:nvGraphicFramePr>
         <p:xfrm>
           <a:off x="389466" y="304799"/>
-          <a:ext cx="11557000" cy="4947920"/>
+          <a:ext cx="11557000" cy="5491480"/>
         </p:xfrm>
         <a:graphic>
           <a:graphicData uri="http://schemas.openxmlformats.org/drawingml/2006/table">
@@ -5279,15 +5438,7 @@
                       </a:r>
                       <a:r>
                         <a:rPr lang="ru-RU" dirty="0"/>
-                        <a:t> перезапускает. </a:t>
-                      </a:r>
-                      <a:r>
-                        <a:rPr lang="ru-RU" dirty="0" err="1"/>
-                        <a:t>Нода</a:t>
-                      </a:r>
-                      <a:r>
-                        <a:rPr lang="ru-RU" dirty="0"/>
-                        <a:t> продолжает работу.</a:t>
+                        <a:t> перезапускает. Инстанс продолжает работу.</a:t>
                       </a:r>
                     </a:p>
                   </a:txBody>
@@ -5305,7 +5456,10 @@
                     <a:bodyPr/>
                     <a:lstStyle/>
                     <a:p>
-                      <a:endParaRPr lang="ru-RU" dirty="0"/>
+                      <a:r>
+                        <a:rPr lang="ru-RU" dirty="0"/>
+                        <a:t>Падает инстанс</a:t>
+                      </a:r>
                     </a:p>
                   </a:txBody>
                   <a:tcPr/>
@@ -5315,7 +5469,34 @@
                     <a:bodyPr/>
                     <a:lstStyle/>
                     <a:p>
-                      <a:endParaRPr lang="ru-RU" dirty="0"/>
+                      <a:r>
+                        <a:rPr lang="en-US" dirty="0"/>
+                        <a:t>ELB </a:t>
+                      </a:r>
+                      <a:r>
+                        <a:rPr lang="ru-RU" dirty="0"/>
+                        <a:t>следит за работоспособностью </a:t>
+                      </a:r>
+                      <a:r>
+                        <a:rPr lang="en-US" dirty="0" err="1"/>
+                        <a:t>nginx</a:t>
+                      </a:r>
+                      <a:r>
+                        <a:rPr lang="en-US" dirty="0"/>
+                        <a:t> </a:t>
+                      </a:r>
+                      <a:r>
+                        <a:rPr lang="ru-RU" dirty="0"/>
+                        <a:t>на инстансе с приложением, в случае его неисправности передает сигнал </a:t>
+                      </a:r>
+                      <a:r>
+                        <a:rPr lang="ru-RU" dirty="0" err="1"/>
+                        <a:t>автоскейлеру</a:t>
+                      </a:r>
+                      <a:r>
+                        <a:rPr lang="ru-RU" dirty="0"/>
+                        <a:t> и он пересоздает инстанс.</a:t>
+                      </a:r>
                     </a:p>
                   </a:txBody>
                   <a:tcPr/>
@@ -5347,7 +5528,23 @@
                     <a:p>
                       <a:r>
                         <a:rPr lang="ru-RU" dirty="0"/>
-                        <a:t>Используются 2 инстанса в разных зонах. При падении одной, вторая продолжит работу.</a:t>
+                        <a:t>Используются 2 инстанса в разных зонах. При падении одной, вторая продолжит работу. </a:t>
+                      </a:r>
+                      <a:r>
+                        <a:rPr lang="en-US" dirty="0"/>
+                        <a:t>Nginx </a:t>
+                      </a:r>
+                      <a:r>
+                        <a:rPr lang="ru-RU" dirty="0"/>
+                        <a:t>уберет </a:t>
+                      </a:r>
+                      <a:r>
+                        <a:rPr lang="ru-RU" dirty="0" err="1"/>
+                        <a:t>ноду</a:t>
+                      </a:r>
+                      <a:r>
+                        <a:rPr lang="ru-RU" dirty="0"/>
+                        <a:t> из ротации.</a:t>
                       </a:r>
                     </a:p>
                   </a:txBody>
@@ -5390,7 +5587,15 @@
                     <a:p>
                       <a:r>
                         <a:rPr lang="ru-RU" dirty="0"/>
-                        <a:t>Внешний периметр сети за зоной безопасности балансировщика. Разрешены только 80 и 443 порты. Для первоначальной настройки временно открывается 22 порт с доступом только к пользователю.</a:t>
+                        <a:t>Внешний периметр сети за зоной безопасности балансировщика. Разрешены только 80 и 443 порты</a:t>
+                      </a:r>
+                      <a:r>
+                        <a:rPr lang="en-US" dirty="0"/>
+                        <a:t> </a:t>
+                      </a:r>
+                      <a:r>
+                        <a:rPr lang="ru-RU" dirty="0"/>
+                        <a:t>и 3000 для мониторинга. Для первоначальной настройки временно открывается 22 порт с доступом только к пользователю.</a:t>
                       </a:r>
                       <a:r>
                         <a:rPr lang="en-US" dirty="0"/>
@@ -6063,7 +6268,7 @@
         <p:spPr>
           <a:xfrm>
             <a:off x="8724994" y="3232950"/>
-            <a:ext cx="954107" cy="923330"/>
+            <a:ext cx="999376" cy="1200329"/>
           </a:xfrm>
           <a:prstGeom prst="rect">
             <a:avLst/>
@@ -6105,6 +6310,17 @@
             <a:r>
               <a:rPr lang="en-US" dirty="0" err="1"/>
               <a:t>udp</a:t>
+            </a:r>
+            <a:endParaRPr lang="ru-RU" dirty="0"/>
+          </a:p>
+          <a:p>
+            <a:r>
+              <a:rPr lang="ru-RU" dirty="0"/>
+              <a:t>3000 </a:t>
+            </a:r>
+            <a:r>
+              <a:rPr lang="en-US" dirty="0" err="1"/>
+              <a:t>tcp</a:t>
             </a:r>
             <a:endParaRPr lang="ru-RU" dirty="0"/>
           </a:p>
@@ -6500,6 +6716,141 @@
           <a:chExt cx="0" cy="0"/>
         </a:xfrm>
       </p:grpSpPr>
+      <p:sp>
+        <p:nvSpPr>
+          <p:cNvPr id="2" name="TextBox 1">
+            <a:extLst>
+              <a:ext uri="{FF2B5EF4-FFF2-40B4-BE49-F238E27FC236}">
+                <a16:creationId xmlns:a16="http://schemas.microsoft.com/office/drawing/2014/main" id="{5234DF6D-5F4E-4B6E-B20B-5C8E75606119}"/>
+              </a:ext>
+            </a:extLst>
+          </p:cNvPr>
+          <p:cNvSpPr txBox="1"/>
+          <p:nvPr/>
+        </p:nvSpPr>
+        <p:spPr>
+          <a:xfrm>
+            <a:off x="643467" y="406400"/>
+            <a:ext cx="9685866" cy="2585323"/>
+          </a:xfrm>
+          <a:prstGeom prst="rect">
+            <a:avLst/>
+          </a:prstGeom>
+          <a:noFill/>
+        </p:spPr>
+        <p:txBody>
+          <a:bodyPr wrap="square" rtlCol="0">
+            <a:spAutoFit/>
+          </a:bodyPr>
+          <a:lstStyle/>
+          <a:p>
+            <a:pPr algn="ctr"/>
+            <a:r>
+              <a:rPr lang="en-US" dirty="0"/>
+              <a:t>QA</a:t>
+            </a:r>
+          </a:p>
+          <a:p>
+            <a:pPr marL="342900" indent="-342900">
+              <a:buAutoNum type="arabicParenR"/>
+            </a:pPr>
+            <a:r>
+              <a:rPr lang="ru-RU" dirty="0"/>
+              <a:t>Почему не </a:t>
+            </a:r>
+            <a:r>
+              <a:rPr lang="en-US" dirty="0"/>
+              <a:t>Kubernetes</a:t>
+            </a:r>
+            <a:r>
+              <a:rPr lang="ru-RU" dirty="0"/>
+              <a:t>?</a:t>
+            </a:r>
+          </a:p>
+          <a:p>
+            <a:r>
+              <a:rPr lang="ru-RU" dirty="0"/>
+              <a:t>Для 2 экземпляров приложения не увидел смысла. Да, он даст большую степень доступности, но  нам не требуется избыточная надежность в задании. Балансировщик пришлось бы все равно поднимать свой , а не только пользоваться </a:t>
+            </a:r>
+            <a:r>
+              <a:rPr lang="en-US" dirty="0"/>
+              <a:t>ingress.</a:t>
+            </a:r>
+          </a:p>
+          <a:p>
+            <a:r>
+              <a:rPr lang="ru-RU" dirty="0"/>
+              <a:t>Текущая версия проекта требует 5 </a:t>
+            </a:r>
+            <a:r>
+              <a:rPr lang="ru-RU" dirty="0" err="1"/>
+              <a:t>физ</a:t>
+            </a:r>
+            <a:r>
+              <a:rPr lang="ru-RU" dirty="0"/>
+              <a:t> ядер и 7 </a:t>
+            </a:r>
+            <a:r>
+              <a:rPr lang="ru-RU" dirty="0" err="1"/>
+              <a:t>гб</a:t>
+            </a:r>
+            <a:r>
+              <a:rPr lang="ru-RU" dirty="0"/>
+              <a:t> </a:t>
+            </a:r>
+            <a:r>
+              <a:rPr lang="ru-RU" dirty="0" err="1"/>
+              <a:t>физ</a:t>
+            </a:r>
+            <a:r>
+              <a:rPr lang="ru-RU" dirty="0"/>
+              <a:t> памяти. Если мы выбрали бы </a:t>
+            </a:r>
+            <a:r>
+              <a:rPr lang="en-US" dirty="0"/>
+              <a:t>Kubernetes SaaS 2 </a:t>
+            </a:r>
+            <a:r>
+              <a:rPr lang="ru-RU" dirty="0" err="1"/>
+              <a:t>нодами</a:t>
+            </a:r>
+            <a:r>
+              <a:rPr lang="en-US" dirty="0"/>
+              <a:t> </a:t>
+            </a:r>
+            <a:r>
+              <a:rPr lang="ru-RU" dirty="0"/>
+              <a:t>в 2 зонах доступности, то это</a:t>
+            </a:r>
+            <a:r>
+              <a:rPr lang="en-US" dirty="0"/>
+              <a:t> 8 </a:t>
+            </a:r>
+            <a:r>
+              <a:rPr lang="ru-RU" dirty="0"/>
+              <a:t>ядер и 16 </a:t>
+            </a:r>
+            <a:r>
+              <a:rPr lang="ru-RU" dirty="0" err="1"/>
+              <a:t>гб</a:t>
+            </a:r>
+            <a:r>
+              <a:rPr lang="ru-RU" dirty="0"/>
+              <a:t> памяти, что дороже.</a:t>
+            </a:r>
+          </a:p>
+          <a:p>
+            <a:endParaRPr lang="ru-RU" dirty="0"/>
+          </a:p>
+          <a:p>
+            <a:r>
+              <a:rPr lang="ru-RU" dirty="0"/>
+              <a:t>2)</a:t>
+            </a:r>
+            <a:endParaRPr lang="en-US" dirty="0"/>
+          </a:p>
+        </p:txBody>
+      </p:sp>
     </p:spTree>
     <p:extLst>
       <p:ext uri="{BB962C8B-B14F-4D97-AF65-F5344CB8AC3E}">
@@ -7232,7 +7583,7 @@
         <p:spPr>
           <a:xfrm>
             <a:off x="471737" y="533719"/>
-            <a:ext cx="10710945" cy="4801314"/>
+            <a:ext cx="10710945" cy="5909310"/>
           </a:xfrm>
           <a:prstGeom prst="rect">
             <a:avLst/>
@@ -7360,6 +7711,40 @@
             <a:r>
               <a:rPr lang="ru-RU" dirty="0"/>
               <a:t>проверить ничего ли мы не упустили</a:t>
+            </a:r>
+          </a:p>
+          <a:p>
+            <a:endParaRPr lang="ru-RU" dirty="0"/>
+          </a:p>
+          <a:p>
+            <a:endParaRPr lang="ru-RU" dirty="0"/>
+          </a:p>
+          <a:p>
+            <a:r>
+              <a:rPr lang="ru-RU" dirty="0"/>
+              <a:t>Замечено , что при деструктивном падении приложения </a:t>
+            </a:r>
+          </a:p>
+          <a:p>
+            <a:r>
+              <a:rPr lang="en-US" i="1" dirty="0"/>
+              <a:t>Health</a:t>
+            </a:r>
+            <a:r>
+              <a:rPr lang="ru-RU" i="1" dirty="0"/>
+              <a:t>с</a:t>
+            </a:r>
+            <a:r>
+              <a:rPr lang="en-US" i="1" dirty="0"/>
+              <a:t>heck</a:t>
+            </a:r>
+            <a:r>
+              <a:rPr lang="en-US" dirty="0"/>
+              <a:t> </a:t>
+            </a:r>
+            <a:r>
+              <a:rPr lang="ru-RU" dirty="0"/>
+              <a:t>частично продолжает срабатывать, потому что приложение периодически отвечает.</a:t>
             </a:r>
           </a:p>
           <a:p>

</xml_diff>